<commit_message>
datasheet ready for PollingLab
</commit_message>
<xml_diff>
--- a/extras/datasheet/pinouts/pinouts.pptx
+++ b/extras/datasheet/pinouts/pinouts.pptx
@@ -105,6 +105,11 @@
       </a:defRPr>
     </a:lvl9pPr>
   </p:defaultTextStyle>
+  <p:extLst>
+    <p:ext uri="{EFAFB233-063F-42B5-8137-9DF3F51BA10A}">
+      <p15:sldGuideLst xmlns:p15="http://schemas.microsoft.com/office/powerpoint/2012/main"/>
+    </p:ext>
+  </p:extLst>
 </p:presentation>
 </file>
 
@@ -239,7 +244,7 @@
           <a:p>
             <a:fld id="{97EAEF73-D529-3542-A98D-07D7E026C8B3}" type="datetimeFigureOut">
               <a:rPr lang="en-US" smtClean="0"/>
-              <a:t>9/5/22</a:t>
+              <a:t>11/8/22</a:t>
             </a:fld>
             <a:endParaRPr lang="en-US"/>
           </a:p>
@@ -409,7 +414,7 @@
           <a:p>
             <a:fld id="{97EAEF73-D529-3542-A98D-07D7E026C8B3}" type="datetimeFigureOut">
               <a:rPr lang="en-US" smtClean="0"/>
-              <a:t>9/5/22</a:t>
+              <a:t>11/8/22</a:t>
             </a:fld>
             <a:endParaRPr lang="en-US"/>
           </a:p>
@@ -589,7 +594,7 @@
           <a:p>
             <a:fld id="{97EAEF73-D529-3542-A98D-07D7E026C8B3}" type="datetimeFigureOut">
               <a:rPr lang="en-US" smtClean="0"/>
-              <a:t>9/5/22</a:t>
+              <a:t>11/8/22</a:t>
             </a:fld>
             <a:endParaRPr lang="en-US"/>
           </a:p>
@@ -759,7 +764,7 @@
           <a:p>
             <a:fld id="{97EAEF73-D529-3542-A98D-07D7E026C8B3}" type="datetimeFigureOut">
               <a:rPr lang="en-US" smtClean="0"/>
-              <a:t>9/5/22</a:t>
+              <a:t>11/8/22</a:t>
             </a:fld>
             <a:endParaRPr lang="en-US"/>
           </a:p>
@@ -1003,7 +1008,7 @@
           <a:p>
             <a:fld id="{97EAEF73-D529-3542-A98D-07D7E026C8B3}" type="datetimeFigureOut">
               <a:rPr lang="en-US" smtClean="0"/>
-              <a:t>9/5/22</a:t>
+              <a:t>11/8/22</a:t>
             </a:fld>
             <a:endParaRPr lang="en-US"/>
           </a:p>
@@ -1235,7 +1240,7 @@
           <a:p>
             <a:fld id="{97EAEF73-D529-3542-A98D-07D7E026C8B3}" type="datetimeFigureOut">
               <a:rPr lang="en-US" smtClean="0"/>
-              <a:t>9/5/22</a:t>
+              <a:t>11/8/22</a:t>
             </a:fld>
             <a:endParaRPr lang="en-US"/>
           </a:p>
@@ -1602,7 +1607,7 @@
           <a:p>
             <a:fld id="{97EAEF73-D529-3542-A98D-07D7E026C8B3}" type="datetimeFigureOut">
               <a:rPr lang="en-US" smtClean="0"/>
-              <a:t>9/5/22</a:t>
+              <a:t>11/8/22</a:t>
             </a:fld>
             <a:endParaRPr lang="en-US"/>
           </a:p>
@@ -1720,7 +1725,7 @@
           <a:p>
             <a:fld id="{97EAEF73-D529-3542-A98D-07D7E026C8B3}" type="datetimeFigureOut">
               <a:rPr lang="en-US" smtClean="0"/>
-              <a:t>9/5/22</a:t>
+              <a:t>11/8/22</a:t>
             </a:fld>
             <a:endParaRPr lang="en-US"/>
           </a:p>
@@ -1815,7 +1820,7 @@
           <a:p>
             <a:fld id="{97EAEF73-D529-3542-A98D-07D7E026C8B3}" type="datetimeFigureOut">
               <a:rPr lang="en-US" smtClean="0"/>
-              <a:t>9/5/22</a:t>
+              <a:t>11/8/22</a:t>
             </a:fld>
             <a:endParaRPr lang="en-US"/>
           </a:p>
@@ -2092,7 +2097,7 @@
           <a:p>
             <a:fld id="{97EAEF73-D529-3542-A98D-07D7E026C8B3}" type="datetimeFigureOut">
               <a:rPr lang="en-US" smtClean="0"/>
-              <a:t>9/5/22</a:t>
+              <a:t>11/8/22</a:t>
             </a:fld>
             <a:endParaRPr lang="en-US"/>
           </a:p>
@@ -2349,7 +2354,7 @@
           <a:p>
             <a:fld id="{97EAEF73-D529-3542-A98D-07D7E026C8B3}" type="datetimeFigureOut">
               <a:rPr lang="en-US" smtClean="0"/>
-              <a:t>9/5/22</a:t>
+              <a:t>11/8/22</a:t>
             </a:fld>
             <a:endParaRPr lang="en-US"/>
           </a:p>
@@ -2562,7 +2567,7 @@
           <a:p>
             <a:fld id="{97EAEF73-D529-3542-A98D-07D7E026C8B3}" type="datetimeFigureOut">
               <a:rPr lang="en-US" smtClean="0"/>
-              <a:t>9/5/22</a:t>
+              <a:t>11/8/22</a:t>
             </a:fld>
             <a:endParaRPr lang="en-US"/>
           </a:p>
@@ -3002,10 +3007,10 @@
       </p:sp>
       <p:grpSp>
         <p:nvGrpSpPr>
-          <p:cNvPr id="458" name="Group 457">
+          <p:cNvPr id="4" name="Group 3">
             <a:extLst>
               <a:ext uri="{FF2B5EF4-FFF2-40B4-BE49-F238E27FC236}">
-                <a16:creationId xmlns:a16="http://schemas.microsoft.com/office/drawing/2014/main" id="{AE450D2B-A076-D025-C6B7-8C9614C06725}"/>
+                <a16:creationId xmlns:a16="http://schemas.microsoft.com/office/drawing/2014/main" id="{14C2ACCE-BAF3-B959-3F5E-1C7319898E2E}"/>
               </a:ext>
             </a:extLst>
           </p:cNvPr>
@@ -7611,8 +7616,8 @@
               </p:nvSpPr>
               <p:spPr>
                 <a:xfrm rot="16200000">
-                  <a:off x="10163065" y="4877817"/>
-                  <a:ext cx="476413" cy="276999"/>
+                  <a:off x="10061934" y="4978947"/>
+                  <a:ext cx="678675" cy="276999"/>
                 </a:xfrm>
                 <a:prstGeom prst="rect">
                   <a:avLst/>
@@ -7791,8 +7796,8 @@
               </p:nvSpPr>
               <p:spPr>
                 <a:xfrm rot="16200000">
-                  <a:off x="9587766" y="2361702"/>
-                  <a:ext cx="476413" cy="276999"/>
+                  <a:off x="9500691" y="2274626"/>
+                  <a:ext cx="650564" cy="276999"/>
                 </a:xfrm>
                 <a:prstGeom prst="rect">
                   <a:avLst/>
@@ -8593,7 +8598,7 @@
               </a:pathLst>
             </a:custGeom>
             <a:solidFill>
-              <a:schemeClr val="tx1"/>
+              <a:schemeClr val="bg1"/>
             </a:solidFill>
             <a:ln>
               <a:solidFill>
@@ -9888,7 +9893,7 @@
               </a:pathLst>
             </a:custGeom>
             <a:solidFill>
-              <a:schemeClr val="tx1"/>
+              <a:schemeClr val="bg1"/>
             </a:solidFill>
             <a:ln>
               <a:solidFill>
@@ -11009,7 +11014,7 @@
           </p:blipFill>
           <p:spPr>
             <a:xfrm>
-              <a:off x="1564459" y="2520029"/>
+              <a:off x="1564459" y="2306882"/>
               <a:ext cx="431800" cy="269468"/>
             </a:xfrm>
             <a:prstGeom prst="rect">
@@ -11049,7 +11054,7 @@
           </p:blipFill>
           <p:spPr>
             <a:xfrm rot="5400000">
-              <a:off x="1350545" y="2695706"/>
+              <a:off x="1350545" y="2482559"/>
               <a:ext cx="431800" cy="376990"/>
             </a:xfrm>
             <a:prstGeom prst="rect">
@@ -11075,8 +11080,8 @@
           </p:nvCxnSpPr>
           <p:spPr>
             <a:xfrm flipH="1" flipV="1">
-              <a:off x="1566445" y="3100101"/>
-              <a:ext cx="326" cy="309466"/>
+              <a:off x="1566445" y="2886954"/>
+              <a:ext cx="326" cy="522613"/>
             </a:xfrm>
             <a:prstGeom prst="line">
               <a:avLst/>
@@ -11116,7 +11121,7 @@
           </p:nvGrpSpPr>
           <p:grpSpPr>
             <a:xfrm>
-              <a:off x="1923618" y="2667122"/>
+              <a:off x="1923618" y="2453975"/>
               <a:ext cx="144229" cy="142875"/>
               <a:chOff x="3654425" y="1504950"/>
               <a:chExt cx="144229" cy="142875"/>
@@ -11361,10 +11366,10 @@
       </p:sp>
       <p:grpSp>
         <p:nvGrpSpPr>
-          <p:cNvPr id="27" name="Group 26">
+          <p:cNvPr id="26" name="Group 25">
             <a:extLst>
               <a:ext uri="{FF2B5EF4-FFF2-40B4-BE49-F238E27FC236}">
-                <a16:creationId xmlns:a16="http://schemas.microsoft.com/office/drawing/2014/main" id="{BABEA35C-FC7B-D625-5E84-7B934165349C}"/>
+                <a16:creationId xmlns:a16="http://schemas.microsoft.com/office/drawing/2014/main" id="{2CD7DE69-E85E-10C5-DA02-FDD6CE36924B}"/>
               </a:ext>
             </a:extLst>
           </p:cNvPr>
@@ -15970,8 +15975,8 @@
               </p:nvSpPr>
               <p:spPr>
                 <a:xfrm rot="16200000">
-                  <a:off x="10163065" y="4877817"/>
-                  <a:ext cx="476413" cy="276999"/>
+                  <a:off x="10043201" y="4997680"/>
+                  <a:ext cx="716141" cy="276999"/>
                 </a:xfrm>
                 <a:prstGeom prst="rect">
                   <a:avLst/>
@@ -16150,8 +16155,8 @@
               </p:nvSpPr>
               <p:spPr>
                 <a:xfrm rot="16200000">
-                  <a:off x="9587766" y="2361702"/>
-                  <a:ext cx="476413" cy="276999"/>
+                  <a:off x="9520381" y="2294316"/>
+                  <a:ext cx="611183" cy="276999"/>
                 </a:xfrm>
                 <a:prstGeom prst="rect">
                   <a:avLst/>
@@ -16882,7 +16887,7 @@
               </a:pathLst>
             </a:custGeom>
             <a:solidFill>
-              <a:schemeClr val="tx1"/>
+              <a:schemeClr val="bg1"/>
             </a:solidFill>
             <a:ln>
               <a:solidFill>
@@ -18177,7 +18182,7 @@
               </a:pathLst>
             </a:custGeom>
             <a:solidFill>
-              <a:schemeClr val="tx1"/>
+              <a:schemeClr val="bg1"/>
             </a:solidFill>
             <a:ln>
               <a:solidFill>
@@ -18273,8 +18278,8 @@
           </p:nvCxnSpPr>
           <p:spPr>
             <a:xfrm rot="16200000" flipV="1">
-              <a:off x="1635539" y="3187335"/>
-              <a:ext cx="318427" cy="126037"/>
+              <a:off x="1568380" y="3120176"/>
+              <a:ext cx="452745" cy="126037"/>
             </a:xfrm>
             <a:prstGeom prst="bentConnector3">
               <a:avLst>
@@ -18320,8 +18325,8 @@
           </p:nvCxnSpPr>
           <p:spPr>
             <a:xfrm rot="16200000" flipH="1">
-              <a:off x="1989266" y="3249175"/>
-              <a:ext cx="318427" cy="2356"/>
+              <a:off x="1922107" y="3182016"/>
+              <a:ext cx="452745" cy="2356"/>
             </a:xfrm>
             <a:prstGeom prst="bentConnector3">
               <a:avLst>
@@ -18544,7 +18549,7 @@
           </p:blipFill>
           <p:spPr>
             <a:xfrm>
-              <a:off x="1564459" y="2520029"/>
+              <a:off x="1564459" y="2302271"/>
               <a:ext cx="431800" cy="269468"/>
             </a:xfrm>
             <a:prstGeom prst="rect">
@@ -18584,7 +18589,7 @@
           </p:blipFill>
           <p:spPr>
             <a:xfrm rot="5400000">
-              <a:off x="1350545" y="2695706"/>
+              <a:off x="1350545" y="2477948"/>
               <a:ext cx="431800" cy="376990"/>
             </a:xfrm>
             <a:prstGeom prst="rect">
@@ -18610,8 +18615,8 @@
           </p:nvCxnSpPr>
           <p:spPr>
             <a:xfrm flipH="1" flipV="1">
-              <a:off x="1566445" y="3100101"/>
-              <a:ext cx="326" cy="309466"/>
+              <a:off x="1566445" y="2882343"/>
+              <a:ext cx="326" cy="527224"/>
             </a:xfrm>
             <a:prstGeom prst="line">
               <a:avLst/>
@@ -18651,7 +18656,7 @@
           </p:nvGrpSpPr>
           <p:grpSpPr>
             <a:xfrm>
-              <a:off x="1923618" y="2667122"/>
+              <a:off x="1923618" y="2449364"/>
               <a:ext cx="144229" cy="142875"/>
               <a:chOff x="3654425" y="1504950"/>
               <a:chExt cx="144229" cy="142875"/>
@@ -18866,27 +18871,6 @@
             </a:p>
           </p:txBody>
         </p:sp>
-      </p:grpSp>
-      <p:grpSp>
-        <p:nvGrpSpPr>
-          <p:cNvPr id="2" name="Group 1">
-            <a:extLst>
-              <a:ext uri="{FF2B5EF4-FFF2-40B4-BE49-F238E27FC236}">
-                <a16:creationId xmlns:a16="http://schemas.microsoft.com/office/drawing/2014/main" id="{72168312-6B74-7ABC-6461-BE8495791075}"/>
-              </a:ext>
-            </a:extLst>
-          </p:cNvPr>
-          <p:cNvGrpSpPr/>
-          <p:nvPr/>
-        </p:nvGrpSpPr>
-        <p:grpSpPr>
-          <a:xfrm>
-            <a:off x="1699995" y="2959529"/>
-            <a:ext cx="254550" cy="131611"/>
-            <a:chOff x="5237936" y="8408361"/>
-            <a:chExt cx="254550" cy="131611"/>
-          </a:xfrm>
-        </p:grpSpPr>
         <p:sp>
           <p:nvSpPr>
             <p:cNvPr id="3" name="Oval 2">
@@ -18901,7 +18885,7 @@
           </p:nvSpPr>
           <p:spPr>
             <a:xfrm>
-              <a:off x="5237936" y="8476497"/>
+              <a:off x="1699995" y="2893347"/>
               <a:ext cx="63475" cy="63475"/>
             </a:xfrm>
             <a:prstGeom prst="ellipse">
@@ -18961,7 +18945,7 @@
           </p:nvSpPr>
           <p:spPr>
             <a:xfrm>
-              <a:off x="5424708" y="8469454"/>
+              <a:off x="1886767" y="2886304"/>
               <a:ext cx="63475" cy="63475"/>
             </a:xfrm>
             <a:prstGeom prst="ellipse">
@@ -19024,7 +19008,7 @@
           </p:nvCxnSpPr>
           <p:spPr>
             <a:xfrm flipV="1">
-              <a:off x="5247232" y="8408361"/>
+              <a:off x="1709291" y="2825211"/>
               <a:ext cx="245254" cy="77432"/>
             </a:xfrm>
             <a:prstGeom prst="line">
@@ -19051,27 +19035,6 @@
             </a:fontRef>
           </p:style>
         </p:cxnSp>
-      </p:grpSp>
-      <p:grpSp>
-        <p:nvGrpSpPr>
-          <p:cNvPr id="6" name="Group 5">
-            <a:extLst>
-              <a:ext uri="{FF2B5EF4-FFF2-40B4-BE49-F238E27FC236}">
-                <a16:creationId xmlns:a16="http://schemas.microsoft.com/office/drawing/2014/main" id="{105F57A7-B32F-C8AE-D5D3-ECA5EF713C6C}"/>
-              </a:ext>
-            </a:extLst>
-          </p:cNvPr>
-          <p:cNvGrpSpPr/>
-          <p:nvPr/>
-        </p:nvGrpSpPr>
-        <p:grpSpPr>
-          <a:xfrm>
-            <a:off x="1847470" y="3069248"/>
-            <a:ext cx="144229" cy="142875"/>
-            <a:chOff x="3654425" y="1504950"/>
-            <a:chExt cx="144229" cy="142875"/>
-          </a:xfrm>
-        </p:grpSpPr>
         <p:cxnSp>
           <p:nvCxnSpPr>
             <p:cNvPr id="7" name="Straight Connector 6">
@@ -19088,7 +19051,7 @@
           </p:nvCxnSpPr>
           <p:spPr>
             <a:xfrm>
-              <a:off x="3723117" y="1504950"/>
+              <a:off x="1916162" y="2934930"/>
               <a:ext cx="0" cy="79375"/>
             </a:xfrm>
             <a:prstGeom prst="line">
@@ -19131,7 +19094,7 @@
           </p:nvCxnSpPr>
           <p:spPr>
             <a:xfrm>
-              <a:off x="3654425" y="1587500"/>
+              <a:off x="1847470" y="3017480"/>
               <a:ext cx="144229" cy="0"/>
             </a:xfrm>
             <a:prstGeom prst="line">
@@ -19174,7 +19137,7 @@
           </p:nvCxnSpPr>
           <p:spPr>
             <a:xfrm>
-              <a:off x="3673537" y="1619250"/>
+              <a:off x="1866582" y="3049230"/>
               <a:ext cx="106107" cy="0"/>
             </a:xfrm>
             <a:prstGeom prst="line">
@@ -19217,7 +19180,7 @@
           </p:nvCxnSpPr>
           <p:spPr>
             <a:xfrm>
-              <a:off x="3692950" y="1647825"/>
+              <a:off x="1885995" y="3077805"/>
               <a:ext cx="63479" cy="0"/>
             </a:xfrm>
             <a:prstGeom prst="line">
@@ -19244,27 +19207,6 @@
             </a:fontRef>
           </p:style>
         </p:cxnSp>
-      </p:grpSp>
-      <p:grpSp>
-        <p:nvGrpSpPr>
-          <p:cNvPr id="11" name="Group 10">
-            <a:extLst>
-              <a:ext uri="{FF2B5EF4-FFF2-40B4-BE49-F238E27FC236}">
-                <a16:creationId xmlns:a16="http://schemas.microsoft.com/office/drawing/2014/main" id="{A6C5BF95-C9A7-7E00-AC5F-09AF8C8198D6}"/>
-              </a:ext>
-            </a:extLst>
-          </p:cNvPr>
-          <p:cNvGrpSpPr/>
-          <p:nvPr/>
-        </p:nvGrpSpPr>
-        <p:grpSpPr>
-          <a:xfrm>
-            <a:off x="2115563" y="2959529"/>
-            <a:ext cx="254550" cy="131611"/>
-            <a:chOff x="5237936" y="8408361"/>
-            <a:chExt cx="254550" cy="131611"/>
-          </a:xfrm>
-        </p:grpSpPr>
         <p:sp>
           <p:nvSpPr>
             <p:cNvPr id="12" name="Oval 11">
@@ -19279,7 +19221,7 @@
           </p:nvSpPr>
           <p:spPr>
             <a:xfrm>
-              <a:off x="5237936" y="8476497"/>
+              <a:off x="2115563" y="2893347"/>
               <a:ext cx="63475" cy="63475"/>
             </a:xfrm>
             <a:prstGeom prst="ellipse">
@@ -19339,7 +19281,7 @@
           </p:nvSpPr>
           <p:spPr>
             <a:xfrm>
-              <a:off x="5424708" y="8469454"/>
+              <a:off x="2302335" y="2886304"/>
               <a:ext cx="63475" cy="63475"/>
             </a:xfrm>
             <a:prstGeom prst="ellipse">
@@ -19402,7 +19344,7 @@
           </p:nvCxnSpPr>
           <p:spPr>
             <a:xfrm flipV="1">
-              <a:off x="5247232" y="8408361"/>
+              <a:off x="2124859" y="2825211"/>
               <a:ext cx="245254" cy="77432"/>
             </a:xfrm>
             <a:prstGeom prst="line">
@@ -19429,27 +19371,6 @@
             </a:fontRef>
           </p:style>
         </p:cxnSp>
-      </p:grpSp>
-      <p:grpSp>
-        <p:nvGrpSpPr>
-          <p:cNvPr id="15" name="Group 14">
-            <a:extLst>
-              <a:ext uri="{FF2B5EF4-FFF2-40B4-BE49-F238E27FC236}">
-                <a16:creationId xmlns:a16="http://schemas.microsoft.com/office/drawing/2014/main" id="{62FF0EE9-A3C6-4779-D1A1-E2F2D36F79C1}"/>
-              </a:ext>
-            </a:extLst>
-          </p:cNvPr>
-          <p:cNvGrpSpPr/>
-          <p:nvPr/>
-        </p:nvGrpSpPr>
-        <p:grpSpPr>
-          <a:xfrm>
-            <a:off x="2268580" y="3069248"/>
-            <a:ext cx="144229" cy="142875"/>
-            <a:chOff x="3654425" y="1504950"/>
-            <a:chExt cx="144229" cy="142875"/>
-          </a:xfrm>
-        </p:grpSpPr>
         <p:cxnSp>
           <p:nvCxnSpPr>
             <p:cNvPr id="16" name="Straight Connector 15">
@@ -19466,7 +19387,7 @@
           </p:nvCxnSpPr>
           <p:spPr>
             <a:xfrm>
-              <a:off x="3723117" y="1504950"/>
+              <a:off x="2337272" y="2934930"/>
               <a:ext cx="0" cy="79375"/>
             </a:xfrm>
             <a:prstGeom prst="line">
@@ -19509,7 +19430,7 @@
           </p:nvCxnSpPr>
           <p:spPr>
             <a:xfrm>
-              <a:off x="3654425" y="1587500"/>
+              <a:off x="2268580" y="3017480"/>
               <a:ext cx="144229" cy="0"/>
             </a:xfrm>
             <a:prstGeom prst="line">
@@ -19552,7 +19473,7 @@
           </p:nvCxnSpPr>
           <p:spPr>
             <a:xfrm>
-              <a:off x="3673537" y="1619250"/>
+              <a:off x="2287692" y="3049230"/>
               <a:ext cx="106107" cy="0"/>
             </a:xfrm>
             <a:prstGeom prst="line">
@@ -19595,7 +19516,7 @@
           </p:nvCxnSpPr>
           <p:spPr>
             <a:xfrm>
-              <a:off x="3692950" y="1647825"/>
+              <a:off x="2307105" y="3077805"/>
               <a:ext cx="63479" cy="0"/>
             </a:xfrm>
             <a:prstGeom prst="line">

</xml_diff>